<commit_message>
Update pptx and pdf file
</commit_message>
<xml_diff>
--- a/Transformations Overview.pptx
+++ b/Transformations Overview.pptx
@@ -107,12 +107,12 @@
   <p:extLst>
     <p:ext uri="{EFAFB233-063F-42B5-8137-9DF3F51BA10A}">
       <p15:sldGuideLst xmlns:p15="http://schemas.microsoft.com/office/powerpoint/2012/main">
-        <p15:guide id="1" orient="horz" pos="3546" userDrawn="1">
+        <p15:guide id="1" orient="horz" pos="3568" userDrawn="1">
           <p15:clr>
             <a:srgbClr val="A4A3A4"/>
           </p15:clr>
         </p15:guide>
-        <p15:guide id="2" pos="2286" userDrawn="1">
+        <p15:guide id="2" pos="6731" userDrawn="1">
           <p15:clr>
             <a:srgbClr val="A4A3A4"/>
           </p15:clr>
@@ -127,17 +127,113 @@
 <pc:chgInfo xmlns:a="http://schemas.openxmlformats.org/drawingml/2006/main" xmlns:r="http://schemas.openxmlformats.org/officeDocument/2006/relationships" xmlns:ac="http://schemas.microsoft.com/office/drawing/2013/main/command" xmlns:pc="http://schemas.microsoft.com/office/powerpoint/2013/main/command">
   <pc:docChgLst>
     <pc:chgData name="Stefan Rickli" userId="675019f7ee87259b" providerId="LiveId" clId="{A1E897A5-9BA4-4671-AC34-26BFDE81406C}"/>
-    <pc:docChg chg="modSld">
-      <pc:chgData name="Stefan Rickli" userId="675019f7ee87259b" providerId="LiveId" clId="{A1E897A5-9BA4-4671-AC34-26BFDE81406C}" dt="2018-10-27T21:16:00.140" v="51" actId="20577"/>
+    <pc:docChg chg="undo redo modSld">
+      <pc:chgData name="Stefan Rickli" userId="675019f7ee87259b" providerId="LiveId" clId="{A1E897A5-9BA4-4671-AC34-26BFDE81406C}" dt="2018-11-01T09:36:02.184" v="196" actId="1037"/>
       <pc:docMkLst>
         <pc:docMk/>
       </pc:docMkLst>
       <pc:sldChg chg="modSp">
-        <pc:chgData name="Stefan Rickli" userId="675019f7ee87259b" providerId="LiveId" clId="{A1E897A5-9BA4-4671-AC34-26BFDE81406C}" dt="2018-10-27T21:16:00.140" v="51" actId="20577"/>
+        <pc:chgData name="Stefan Rickli" userId="675019f7ee87259b" providerId="LiveId" clId="{A1E897A5-9BA4-4671-AC34-26BFDE81406C}" dt="2018-11-01T09:36:02.184" v="196" actId="1037"/>
         <pc:sldMkLst>
           <pc:docMk/>
           <pc:sldMk cId="1045575422" sldId="256"/>
         </pc:sldMkLst>
+        <pc:spChg chg="mod">
+          <ac:chgData name="Stefan Rickli" userId="675019f7ee87259b" providerId="LiveId" clId="{A1E897A5-9BA4-4671-AC34-26BFDE81406C}" dt="2018-11-01T09:35:11.532" v="146" actId="1038"/>
+          <ac:spMkLst>
+            <pc:docMk/>
+            <pc:sldMk cId="1045575422" sldId="256"/>
+            <ac:spMk id="4" creationId="{118A8E74-C4AC-4E8F-9FC0-FFF215A6B060}"/>
+          </ac:spMkLst>
+        </pc:spChg>
+        <pc:spChg chg="mod">
+          <ac:chgData name="Stefan Rickli" userId="675019f7ee87259b" providerId="LiveId" clId="{A1E897A5-9BA4-4671-AC34-26BFDE81406C}" dt="2018-11-01T09:35:14.177" v="150" actId="1037"/>
+          <ac:spMkLst>
+            <pc:docMk/>
+            <pc:sldMk cId="1045575422" sldId="256"/>
+            <ac:spMk id="5" creationId="{D4B0A07A-C559-4132-9DDD-57C07935D146}"/>
+          </ac:spMkLst>
+        </pc:spChg>
+        <pc:spChg chg="mod">
+          <ac:chgData name="Stefan Rickli" userId="675019f7ee87259b" providerId="LiveId" clId="{A1E897A5-9BA4-4671-AC34-26BFDE81406C}" dt="2018-11-01T09:34:09.005" v="103" actId="1076"/>
+          <ac:spMkLst>
+            <pc:docMk/>
+            <pc:sldMk cId="1045575422" sldId="256"/>
+            <ac:spMk id="6" creationId="{ECD80190-E0CA-497C-B267-40165CC698F1}"/>
+          </ac:spMkLst>
+        </pc:spChg>
+        <pc:spChg chg="mod">
+          <ac:chgData name="Stefan Rickli" userId="675019f7ee87259b" providerId="LiveId" clId="{A1E897A5-9BA4-4671-AC34-26BFDE81406C}" dt="2018-11-01T09:34:25.407" v="107" actId="1076"/>
+          <ac:spMkLst>
+            <pc:docMk/>
+            <pc:sldMk cId="1045575422" sldId="256"/>
+            <ac:spMk id="7" creationId="{7FCC7585-4063-412F-9A77-692FE23BF555}"/>
+          </ac:spMkLst>
+        </pc:spChg>
+        <pc:spChg chg="mod">
+          <ac:chgData name="Stefan Rickli" userId="675019f7ee87259b" providerId="LiveId" clId="{A1E897A5-9BA4-4671-AC34-26BFDE81406C}" dt="2018-11-01T09:35:06.172" v="123" actId="1037"/>
+          <ac:spMkLst>
+            <pc:docMk/>
+            <pc:sldMk cId="1045575422" sldId="256"/>
+            <ac:spMk id="8" creationId="{93980B90-ABD0-4FF6-81E0-23998C2D0B9C}"/>
+          </ac:spMkLst>
+        </pc:spChg>
+        <pc:spChg chg="mod">
+          <ac:chgData name="Stefan Rickli" userId="675019f7ee87259b" providerId="LiveId" clId="{A1E897A5-9BA4-4671-AC34-26BFDE81406C}" dt="2018-11-01T09:35:01.329" v="120" actId="1038"/>
+          <ac:spMkLst>
+            <pc:docMk/>
+            <pc:sldMk cId="1045575422" sldId="256"/>
+            <ac:spMk id="9" creationId="{E47A266F-B733-4DE0-976D-E3A68CF54059}"/>
+          </ac:spMkLst>
+        </pc:spChg>
+        <pc:spChg chg="mod">
+          <ac:chgData name="Stefan Rickli" userId="675019f7ee87259b" providerId="LiveId" clId="{A1E897A5-9BA4-4671-AC34-26BFDE81406C}" dt="2018-11-01T09:34:06.199" v="102" actId="1076"/>
+          <ac:spMkLst>
+            <pc:docMk/>
+            <pc:sldMk cId="1045575422" sldId="256"/>
+            <ac:spMk id="10" creationId="{5A8D5614-3554-4C78-867D-4282ED19C757}"/>
+          </ac:spMkLst>
+        </pc:spChg>
+        <pc:spChg chg="mod">
+          <ac:chgData name="Stefan Rickli" userId="675019f7ee87259b" providerId="LiveId" clId="{A1E897A5-9BA4-4671-AC34-26BFDE81406C}" dt="2018-11-01T09:34:52.862" v="117" actId="1038"/>
+          <ac:spMkLst>
+            <pc:docMk/>
+            <pc:sldMk cId="1045575422" sldId="256"/>
+            <ac:spMk id="11" creationId="{EF44E698-1B67-4414-B284-E78D236A8B2B}"/>
+          </ac:spMkLst>
+        </pc:spChg>
+        <pc:spChg chg="mod">
+          <ac:chgData name="Stefan Rickli" userId="675019f7ee87259b" providerId="LiveId" clId="{A1E897A5-9BA4-4671-AC34-26BFDE81406C}" dt="2018-11-01T09:35:50.069" v="187" actId="1037"/>
+          <ac:spMkLst>
+            <pc:docMk/>
+            <pc:sldMk cId="1045575422" sldId="256"/>
+            <ac:spMk id="14" creationId="{08AA1247-2276-4ECE-B1FC-5DF2A785D8CF}"/>
+          </ac:spMkLst>
+        </pc:spChg>
+        <pc:spChg chg="mod">
+          <ac:chgData name="Stefan Rickli" userId="675019f7ee87259b" providerId="LiveId" clId="{A1E897A5-9BA4-4671-AC34-26BFDE81406C}" dt="2018-11-01T09:35:50.069" v="187" actId="1037"/>
+          <ac:spMkLst>
+            <pc:docMk/>
+            <pc:sldMk cId="1045575422" sldId="256"/>
+            <ac:spMk id="16" creationId="{5ABCE56D-4F59-4355-9565-3F560BD52D75}"/>
+          </ac:spMkLst>
+        </pc:spChg>
+        <pc:spChg chg="mod">
+          <ac:chgData name="Stefan Rickli" userId="675019f7ee87259b" providerId="LiveId" clId="{A1E897A5-9BA4-4671-AC34-26BFDE81406C}" dt="2018-11-01T09:36:02.184" v="196" actId="1037"/>
+          <ac:spMkLst>
+            <pc:docMk/>
+            <pc:sldMk cId="1045575422" sldId="256"/>
+            <ac:spMk id="18" creationId="{1F212FB8-6D71-481B-9AC1-EC2DB493A17D}"/>
+          </ac:spMkLst>
+        </pc:spChg>
+        <pc:spChg chg="mod">
+          <ac:chgData name="Stefan Rickli" userId="675019f7ee87259b" providerId="LiveId" clId="{A1E897A5-9BA4-4671-AC34-26BFDE81406C}" dt="2018-10-27T21:25:07.158" v="53" actId="207"/>
+          <ac:spMkLst>
+            <pc:docMk/>
+            <pc:sldMk cId="1045575422" sldId="256"/>
+            <ac:spMk id="19" creationId="{04E683DA-4309-4D9A-B8A0-A5AECF545856}"/>
+          </ac:spMkLst>
+        </pc:spChg>
         <pc:spChg chg="mod">
           <ac:chgData name="Stefan Rickli" userId="675019f7ee87259b" providerId="LiveId" clId="{A1E897A5-9BA4-4671-AC34-26BFDE81406C}" dt="2018-10-27T21:16:00.140" v="51" actId="20577"/>
           <ac:spMkLst>
@@ -146,6 +242,70 @@
             <ac:spMk id="53" creationId="{48BCD373-1AD8-4B58-A755-6919D0908622}"/>
           </ac:spMkLst>
         </pc:spChg>
+        <pc:picChg chg="mod">
+          <ac:chgData name="Stefan Rickli" userId="675019f7ee87259b" providerId="LiveId" clId="{A1E897A5-9BA4-4671-AC34-26BFDE81406C}" dt="2018-11-01T09:18:37.809" v="75"/>
+          <ac:picMkLst>
+            <pc:docMk/>
+            <pc:sldMk cId="1045575422" sldId="256"/>
+            <ac:picMk id="22" creationId="{84DE3988-777A-47FE-B753-72D39966FC2B}"/>
+          </ac:picMkLst>
+        </pc:picChg>
+        <pc:picChg chg="mod">
+          <ac:chgData name="Stefan Rickli" userId="675019f7ee87259b" providerId="LiveId" clId="{A1E897A5-9BA4-4671-AC34-26BFDE81406C}" dt="2018-11-01T09:33:49.580" v="100" actId="1076"/>
+          <ac:picMkLst>
+            <pc:docMk/>
+            <pc:sldMk cId="1045575422" sldId="256"/>
+            <ac:picMk id="24" creationId="{A3CD51F4-8D11-4FD0-8558-DEA844DD15CD}"/>
+          </ac:picMkLst>
+        </pc:picChg>
+        <pc:picChg chg="mod">
+          <ac:chgData name="Stefan Rickli" userId="675019f7ee87259b" providerId="LiveId" clId="{A1E897A5-9BA4-4671-AC34-26BFDE81406C}" dt="2018-11-01T09:19:21.192" v="79"/>
+          <ac:picMkLst>
+            <pc:docMk/>
+            <pc:sldMk cId="1045575422" sldId="256"/>
+            <ac:picMk id="26" creationId="{DA2D2EE9-735F-4B2A-A2A6-85BB0C96F5D0}"/>
+          </ac:picMkLst>
+        </pc:picChg>
+        <pc:picChg chg="mod">
+          <ac:chgData name="Stefan Rickli" userId="675019f7ee87259b" providerId="LiveId" clId="{A1E897A5-9BA4-4671-AC34-26BFDE81406C}" dt="2018-11-01T09:19:36.454" v="81"/>
+          <ac:picMkLst>
+            <pc:docMk/>
+            <pc:sldMk cId="1045575422" sldId="256"/>
+            <ac:picMk id="28" creationId="{6FCBCFA1-E19D-40D9-AC25-BDA801F3D008}"/>
+          </ac:picMkLst>
+        </pc:picChg>
+        <pc:picChg chg="mod">
+          <ac:chgData name="Stefan Rickli" userId="675019f7ee87259b" providerId="LiveId" clId="{A1E897A5-9BA4-4671-AC34-26BFDE81406C}" dt="2018-11-01T09:20:46.377" v="93"/>
+          <ac:picMkLst>
+            <pc:docMk/>
+            <pc:sldMk cId="1045575422" sldId="256"/>
+            <ac:picMk id="30" creationId="{215AAF3F-9834-4DE9-AB03-3CA38F386F05}"/>
+          </ac:picMkLst>
+        </pc:picChg>
+        <pc:picChg chg="mod">
+          <ac:chgData name="Stefan Rickli" userId="675019f7ee87259b" providerId="LiveId" clId="{A1E897A5-9BA4-4671-AC34-26BFDE81406C}" dt="2018-11-01T09:33:47.121" v="98" actId="1076"/>
+          <ac:picMkLst>
+            <pc:docMk/>
+            <pc:sldMk cId="1045575422" sldId="256"/>
+            <ac:picMk id="32" creationId="{91C823C0-B3FA-495F-AF6B-DBC119E4A6AC}"/>
+          </ac:picMkLst>
+        </pc:picChg>
+        <pc:picChg chg="mod">
+          <ac:chgData name="Stefan Rickli" userId="675019f7ee87259b" providerId="LiveId" clId="{A1E897A5-9BA4-4671-AC34-26BFDE81406C}" dt="2018-11-01T09:20:02.003" v="85"/>
+          <ac:picMkLst>
+            <pc:docMk/>
+            <pc:sldMk cId="1045575422" sldId="256"/>
+            <ac:picMk id="34" creationId="{E7A2AA20-4594-4E48-B0D1-DE01B33DA12C}"/>
+          </ac:picMkLst>
+        </pc:picChg>
+        <pc:picChg chg="mod">
+          <ac:chgData name="Stefan Rickli" userId="675019f7ee87259b" providerId="LiveId" clId="{A1E897A5-9BA4-4671-AC34-26BFDE81406C}" dt="2018-11-01T09:19:50.926" v="83"/>
+          <ac:picMkLst>
+            <pc:docMk/>
+            <pc:sldMk cId="1045575422" sldId="256"/>
+            <ac:picMk id="36" creationId="{81035C96-9249-46C4-9183-FD16121304C4}"/>
+          </ac:picMkLst>
+        </pc:picChg>
       </pc:sldChg>
     </pc:docChg>
   </pc:docChgLst>
@@ -283,7 +443,7 @@
           <a:p>
             <a:fld id="{4CB2265E-F72F-46DA-9724-0B797912EEB2}" type="datetimeFigureOut">
               <a:rPr lang="de-CH" smtClean="0"/>
-              <a:t>27.10.2018</a:t>
+              <a:t>01.11.2018</a:t>
             </a:fld>
             <a:endParaRPr lang="de-CH"/>
           </a:p>
@@ -453,7 +613,7 @@
           <a:p>
             <a:fld id="{4CB2265E-F72F-46DA-9724-0B797912EEB2}" type="datetimeFigureOut">
               <a:rPr lang="de-CH" smtClean="0"/>
-              <a:t>27.10.2018</a:t>
+              <a:t>01.11.2018</a:t>
             </a:fld>
             <a:endParaRPr lang="de-CH"/>
           </a:p>
@@ -633,7 +793,7 @@
           <a:p>
             <a:fld id="{4CB2265E-F72F-46DA-9724-0B797912EEB2}" type="datetimeFigureOut">
               <a:rPr lang="de-CH" smtClean="0"/>
-              <a:t>27.10.2018</a:t>
+              <a:t>01.11.2018</a:t>
             </a:fld>
             <a:endParaRPr lang="de-CH"/>
           </a:p>
@@ -803,7 +963,7 @@
           <a:p>
             <a:fld id="{4CB2265E-F72F-46DA-9724-0B797912EEB2}" type="datetimeFigureOut">
               <a:rPr lang="de-CH" smtClean="0"/>
-              <a:t>27.10.2018</a:t>
+              <a:t>01.11.2018</a:t>
             </a:fld>
             <a:endParaRPr lang="de-CH"/>
           </a:p>
@@ -1047,7 +1207,7 @@
           <a:p>
             <a:fld id="{4CB2265E-F72F-46DA-9724-0B797912EEB2}" type="datetimeFigureOut">
               <a:rPr lang="de-CH" smtClean="0"/>
-              <a:t>27.10.2018</a:t>
+              <a:t>01.11.2018</a:t>
             </a:fld>
             <a:endParaRPr lang="de-CH"/>
           </a:p>
@@ -1279,7 +1439,7 @@
           <a:p>
             <a:fld id="{4CB2265E-F72F-46DA-9724-0B797912EEB2}" type="datetimeFigureOut">
               <a:rPr lang="de-CH" smtClean="0"/>
-              <a:t>27.10.2018</a:t>
+              <a:t>01.11.2018</a:t>
             </a:fld>
             <a:endParaRPr lang="de-CH"/>
           </a:p>
@@ -1646,7 +1806,7 @@
           <a:p>
             <a:fld id="{4CB2265E-F72F-46DA-9724-0B797912EEB2}" type="datetimeFigureOut">
               <a:rPr lang="de-CH" smtClean="0"/>
-              <a:t>27.10.2018</a:t>
+              <a:t>01.11.2018</a:t>
             </a:fld>
             <a:endParaRPr lang="de-CH"/>
           </a:p>
@@ -1764,7 +1924,7 @@
           <a:p>
             <a:fld id="{4CB2265E-F72F-46DA-9724-0B797912EEB2}" type="datetimeFigureOut">
               <a:rPr lang="de-CH" smtClean="0"/>
-              <a:t>27.10.2018</a:t>
+              <a:t>01.11.2018</a:t>
             </a:fld>
             <a:endParaRPr lang="de-CH"/>
           </a:p>
@@ -1859,7 +2019,7 @@
           <a:p>
             <a:fld id="{4CB2265E-F72F-46DA-9724-0B797912EEB2}" type="datetimeFigureOut">
               <a:rPr lang="de-CH" smtClean="0"/>
-              <a:t>27.10.2018</a:t>
+              <a:t>01.11.2018</a:t>
             </a:fld>
             <a:endParaRPr lang="de-CH"/>
           </a:p>
@@ -2136,7 +2296,7 @@
           <a:p>
             <a:fld id="{4CB2265E-F72F-46DA-9724-0B797912EEB2}" type="datetimeFigureOut">
               <a:rPr lang="de-CH" smtClean="0"/>
-              <a:t>27.10.2018</a:t>
+              <a:t>01.11.2018</a:t>
             </a:fld>
             <a:endParaRPr lang="de-CH"/>
           </a:p>
@@ -2393,7 +2553,7 @@
           <a:p>
             <a:fld id="{4CB2265E-F72F-46DA-9724-0B797912EEB2}" type="datetimeFigureOut">
               <a:rPr lang="de-CH" smtClean="0"/>
-              <a:t>27.10.2018</a:t>
+              <a:t>01.11.2018</a:t>
             </a:fld>
             <a:endParaRPr lang="de-CH"/>
           </a:p>
@@ -2606,7 +2766,7 @@
           <a:p>
             <a:fld id="{4CB2265E-F72F-46DA-9724-0B797912EEB2}" type="datetimeFigureOut">
               <a:rPr lang="de-CH" smtClean="0"/>
-              <a:t>27.10.2018</a:t>
+              <a:t>01.11.2018</a:t>
             </a:fld>
             <a:endParaRPr lang="de-CH"/>
           </a:p>
@@ -3196,8 +3356,8 @@
           <a:chExt cx="0" cy="0"/>
         </a:xfrm>
       </p:grpSpPr>
-      <mc:AlternateContent xmlns:mc="http://schemas.openxmlformats.org/markup-compatibility/2006" xmlns:a14="http://schemas.microsoft.com/office/drawing/2010/main">
-        <mc:Choice Requires="a14">
+      <mc:AlternateContent xmlns:mc="http://schemas.openxmlformats.org/markup-compatibility/2006">
+        <mc:Choice xmlns:a14="http://schemas.microsoft.com/office/drawing/2010/main" Requires="a14">
           <p:sp>
             <p:nvSpPr>
               <p:cNvPr id="4" name="Textfeld 3">
@@ -3212,7 +3372,7 @@
             </p:nvSpPr>
             <p:spPr>
               <a:xfrm>
-                <a:off x="651205" y="1380859"/>
+                <a:off x="478485" y="1380859"/>
                 <a:ext cx="1655068" cy="332912"/>
               </a:xfrm>
               <a:prstGeom prst="rect">
@@ -3431,7 +3591,7 @@
             </p:txBody>
           </p:sp>
         </mc:Choice>
-        <mc:Fallback xmlns="">
+        <mc:Fallback>
           <p:sp>
             <p:nvSpPr>
               <p:cNvPr id="4" name="Textfeld 3">
@@ -3448,7 +3608,7 @@
             </p:nvSpPr>
             <p:spPr>
               <a:xfrm>
-                <a:off x="651205" y="1380859"/>
+                <a:off x="478485" y="1380859"/>
                 <a:ext cx="1655068" cy="332912"/>
               </a:xfrm>
               <a:prstGeom prst="rect">
@@ -3457,7 +3617,7 @@
               <a:blipFill>
                 <a:blip r:embed="rId2"/>
                 <a:stretch>
-                  <a:fillRect l="-738" t="-205556" r="-369" b="-292593"/>
+                  <a:fillRect l="-368" t="-205556" r="-368" b="-292593"/>
                 </a:stretch>
               </a:blipFill>
             </p:spPr>
@@ -3476,8 +3636,8 @@
           </p:sp>
         </mc:Fallback>
       </mc:AlternateContent>
-      <mc:AlternateContent xmlns:mc="http://schemas.openxmlformats.org/markup-compatibility/2006" xmlns:a14="http://schemas.microsoft.com/office/drawing/2010/main">
-        <mc:Choice Requires="a14">
+      <mc:AlternateContent xmlns:mc="http://schemas.openxmlformats.org/markup-compatibility/2006">
+        <mc:Choice xmlns:a14="http://schemas.microsoft.com/office/drawing/2010/main" Requires="a14">
           <p:sp>
             <p:nvSpPr>
               <p:cNvPr id="5" name="Textfeld 4">
@@ -3492,7 +3652,7 @@
             </p:nvSpPr>
             <p:spPr>
               <a:xfrm>
-                <a:off x="697966" y="756810"/>
+                <a:off x="657326" y="756810"/>
                 <a:ext cx="1371401" cy="345736"/>
               </a:xfrm>
               <a:prstGeom prst="rect">
@@ -3773,7 +3933,7 @@
             </p:txBody>
           </p:sp>
         </mc:Choice>
-        <mc:Fallback xmlns="">
+        <mc:Fallback>
           <p:sp>
             <p:nvSpPr>
               <p:cNvPr id="5" name="Textfeld 4">
@@ -3790,7 +3950,7 @@
             </p:nvSpPr>
             <p:spPr>
               <a:xfrm>
-                <a:off x="697966" y="756810"/>
+                <a:off x="657326" y="756810"/>
                 <a:ext cx="1371401" cy="345736"/>
               </a:xfrm>
               <a:prstGeom prst="rect">
@@ -3799,7 +3959,7 @@
               <a:blipFill>
                 <a:blip r:embed="rId3"/>
                 <a:stretch>
-                  <a:fillRect l="-10222" t="-189474" r="-1778" b="-277193"/>
+                  <a:fillRect l="-10667" t="-189474" r="-1333" b="-277193"/>
                 </a:stretch>
               </a:blipFill>
             </p:spPr>
@@ -3818,8 +3978,8 @@
           </p:sp>
         </mc:Fallback>
       </mc:AlternateContent>
-      <mc:AlternateContent xmlns:mc="http://schemas.openxmlformats.org/markup-compatibility/2006" xmlns:a14="http://schemas.microsoft.com/office/drawing/2010/main">
-        <mc:Choice Requires="a14">
+      <mc:AlternateContent xmlns:mc="http://schemas.openxmlformats.org/markup-compatibility/2006">
+        <mc:Choice xmlns:a14="http://schemas.microsoft.com/office/drawing/2010/main" Requires="a14">
           <p:sp>
             <p:nvSpPr>
               <p:cNvPr id="6" name="Textfeld 5">
@@ -3834,7 +3994,7 @@
             </p:nvSpPr>
             <p:spPr>
               <a:xfrm>
-                <a:off x="3682443" y="1380859"/>
+                <a:off x="3613350" y="1380859"/>
                 <a:ext cx="1361205" cy="419602"/>
               </a:xfrm>
               <a:prstGeom prst="rect">
@@ -3995,7 +4155,7 @@
             </p:txBody>
           </p:sp>
         </mc:Choice>
-        <mc:Fallback xmlns="">
+        <mc:Fallback>
           <p:sp>
             <p:nvSpPr>
               <p:cNvPr id="6" name="Textfeld 5">
@@ -4012,7 +4172,7 @@
             </p:nvSpPr>
             <p:spPr>
               <a:xfrm>
-                <a:off x="3682443" y="1380859"/>
+                <a:off x="3613350" y="1380859"/>
                 <a:ext cx="1361205" cy="419602"/>
               </a:xfrm>
               <a:prstGeom prst="rect">
@@ -4021,7 +4181,7 @@
               <a:blipFill>
                 <a:blip r:embed="rId4"/>
                 <a:stretch>
-                  <a:fillRect l="-1794" t="-126471" r="-21525" b="-186765"/>
+                  <a:fillRect l="-2242" t="-126471" r="-21076" b="-186765"/>
                 </a:stretch>
               </a:blipFill>
             </p:spPr>
@@ -4040,8 +4200,8 @@
           </p:sp>
         </mc:Fallback>
       </mc:AlternateContent>
-      <mc:AlternateContent xmlns:mc="http://schemas.openxmlformats.org/markup-compatibility/2006" xmlns:a14="http://schemas.microsoft.com/office/drawing/2010/main">
-        <mc:Choice Requires="a14">
+      <mc:AlternateContent xmlns:mc="http://schemas.openxmlformats.org/markup-compatibility/2006">
+        <mc:Choice xmlns:a14="http://schemas.microsoft.com/office/drawing/2010/main" Requires="a14">
           <p:sp>
             <p:nvSpPr>
               <p:cNvPr id="7" name="Textfeld 6">
@@ -4056,7 +4216,7 @@
             </p:nvSpPr>
             <p:spPr>
               <a:xfrm>
-                <a:off x="3691403" y="756810"/>
+                <a:off x="3636772" y="756810"/>
                 <a:ext cx="1410835" cy="419602"/>
               </a:xfrm>
               <a:prstGeom prst="rect">
@@ -4327,7 +4487,7 @@
             </p:txBody>
           </p:sp>
         </mc:Choice>
-        <mc:Fallback xmlns="">
+        <mc:Fallback>
           <p:sp>
             <p:nvSpPr>
               <p:cNvPr id="7" name="Textfeld 6">
@@ -4344,7 +4504,7 @@
             </p:nvSpPr>
             <p:spPr>
               <a:xfrm>
-                <a:off x="3691403" y="756810"/>
+                <a:off x="3636772" y="756810"/>
                 <a:ext cx="1410835" cy="419602"/>
               </a:xfrm>
               <a:prstGeom prst="rect">
@@ -4372,8 +4532,8 @@
           </p:sp>
         </mc:Fallback>
       </mc:AlternateContent>
-      <mc:AlternateContent xmlns:mc="http://schemas.openxmlformats.org/markup-compatibility/2006" xmlns:a14="http://schemas.microsoft.com/office/drawing/2010/main">
-        <mc:Choice Requires="a14">
+      <mc:AlternateContent xmlns:mc="http://schemas.openxmlformats.org/markup-compatibility/2006">
+        <mc:Choice xmlns:a14="http://schemas.microsoft.com/office/drawing/2010/main" Requires="a14">
           <p:sp>
             <p:nvSpPr>
               <p:cNvPr id="8" name="Textfeld 7">
@@ -4388,8 +4548,8 @@
             </p:nvSpPr>
             <p:spPr>
               <a:xfrm>
-                <a:off x="499962" y="6136065"/>
-                <a:ext cx="2171428" cy="432875"/>
+                <a:off x="469482" y="6136065"/>
+                <a:ext cx="2317237" cy="432875"/>
               </a:xfrm>
               <a:prstGeom prst="rect">
                 <a:avLst/>
@@ -4504,12 +4664,31 @@
                           </m:r>
                         </m:sup>
                         <m:e>
-                          <m:r>
-                            <a:rPr lang="fr-CH" sz="1000" i="1">
-                              <a:latin typeface="Cambria Math" panose="02040503050406030204" pitchFamily="18" charset="0"/>
-                            </a:rPr>
-                            <m:t>𝑋</m:t>
-                          </m:r>
+                          <m:sSub>
+                            <m:sSubPr>
+                              <m:ctrlPr>
+                                <a:rPr lang="de-CH" sz="1000" b="0" i="1" smtClean="0">
+                                  <a:latin typeface="Cambria Math" panose="02040503050406030204" pitchFamily="18" charset="0"/>
+                                </a:rPr>
+                              </m:ctrlPr>
+                            </m:sSubPr>
+                            <m:e>
+                              <m:r>
+                                <a:rPr lang="fr-CH" sz="1000" i="1">
+                                  <a:latin typeface="Cambria Math" panose="02040503050406030204" pitchFamily="18" charset="0"/>
+                                </a:rPr>
+                                <m:t>𝑋</m:t>
+                              </m:r>
+                            </m:e>
+                            <m:sub>
+                              <m:r>
+                                <a:rPr lang="de-CH" sz="1000" b="0" i="1" smtClean="0">
+                                  <a:latin typeface="Cambria Math" panose="02040503050406030204" pitchFamily="18" charset="0"/>
+                                </a:rPr>
+                                <m:t>𝑁</m:t>
+                              </m:r>
+                            </m:sub>
+                          </m:sSub>
                           <m:d>
                             <m:dPr>
                               <m:ctrlPr>
@@ -4686,7 +4865,7 @@
             </p:txBody>
           </p:sp>
         </mc:Choice>
-        <mc:Fallback xmlns="">
+        <mc:Fallback>
           <p:sp>
             <p:nvSpPr>
               <p:cNvPr id="8" name="Textfeld 7">
@@ -4703,8 +4882,8 @@
             </p:nvSpPr>
             <p:spPr>
               <a:xfrm>
-                <a:off x="499962" y="6136065"/>
-                <a:ext cx="2171428" cy="432875"/>
+                <a:off x="469482" y="6136065"/>
+                <a:ext cx="2317237" cy="432875"/>
               </a:xfrm>
               <a:prstGeom prst="rect">
                 <a:avLst/>
@@ -4712,7 +4891,7 @@
               <a:blipFill>
                 <a:blip r:embed="rId6"/>
                 <a:stretch>
-                  <a:fillRect l="-281" t="-116901" r="-843" b="-178873"/>
+                  <a:fillRect t="-116901" b="-178873"/>
                 </a:stretch>
               </a:blipFill>
             </p:spPr>
@@ -4731,8 +4910,8 @@
           </p:sp>
         </mc:Fallback>
       </mc:AlternateContent>
-      <mc:AlternateContent xmlns:mc="http://schemas.openxmlformats.org/markup-compatibility/2006" xmlns:a14="http://schemas.microsoft.com/office/drawing/2010/main">
-        <mc:Choice Requires="a14">
+      <mc:AlternateContent xmlns:mc="http://schemas.openxmlformats.org/markup-compatibility/2006">
+        <mc:Choice xmlns:a14="http://schemas.microsoft.com/office/drawing/2010/main" Requires="a14">
           <p:sp>
             <p:nvSpPr>
               <p:cNvPr id="9" name="Textfeld 8">
@@ -4747,7 +4926,7 @@
             </p:nvSpPr>
             <p:spPr>
               <a:xfrm>
-                <a:off x="499962" y="5425579"/>
+                <a:off x="530442" y="5425579"/>
                 <a:ext cx="1367362" cy="432875"/>
               </a:xfrm>
               <a:prstGeom prst="rect">
@@ -5100,7 +5279,7 @@
             </p:txBody>
           </p:sp>
         </mc:Choice>
-        <mc:Fallback xmlns="">
+        <mc:Fallback>
           <p:sp>
             <p:nvSpPr>
               <p:cNvPr id="9" name="Textfeld 8">
@@ -5117,7 +5296,7 @@
             </p:nvSpPr>
             <p:spPr>
               <a:xfrm>
-                <a:off x="499962" y="5425579"/>
+                <a:off x="530442" y="5425579"/>
                 <a:ext cx="1367362" cy="432875"/>
               </a:xfrm>
               <a:prstGeom prst="rect">
@@ -5145,8 +5324,8 @@
           </p:sp>
         </mc:Fallback>
       </mc:AlternateContent>
-      <mc:AlternateContent xmlns:mc="http://schemas.openxmlformats.org/markup-compatibility/2006" xmlns:a14="http://schemas.microsoft.com/office/drawing/2010/main">
-        <mc:Choice Requires="a14">
+      <mc:AlternateContent xmlns:mc="http://schemas.openxmlformats.org/markup-compatibility/2006">
+        <mc:Choice xmlns:a14="http://schemas.microsoft.com/office/drawing/2010/main" Requires="a14">
           <p:sp>
             <p:nvSpPr>
               <p:cNvPr id="10" name="Textfeld 9">
@@ -5161,8 +5340,8 @@
             </p:nvSpPr>
             <p:spPr>
               <a:xfrm>
-                <a:off x="3591003" y="6136065"/>
-                <a:ext cx="2120772" cy="432875"/>
+                <a:off x="3495838" y="6136065"/>
+                <a:ext cx="2266583" cy="432875"/>
               </a:xfrm>
               <a:prstGeom prst="rect">
                 <a:avLst/>
@@ -5182,12 +5361,31 @@
                       <m:jc m:val="centerGroup"/>
                     </m:oMathParaPr>
                     <m:oMath xmlns:m="http://schemas.openxmlformats.org/officeDocument/2006/math">
-                      <m:r>
-                        <a:rPr lang="fr-CH" sz="1000" i="1" smtClean="0">
-                          <a:latin typeface="Cambria Math" panose="02040503050406030204" pitchFamily="18" charset="0"/>
-                        </a:rPr>
-                        <m:t>𝑋</m:t>
-                      </m:r>
+                      <m:sSub>
+                        <m:sSubPr>
+                          <m:ctrlPr>
+                            <a:rPr lang="de-CH" sz="1000" b="0" i="1" smtClean="0">
+                              <a:latin typeface="Cambria Math" panose="02040503050406030204" pitchFamily="18" charset="0"/>
+                            </a:rPr>
+                          </m:ctrlPr>
+                        </m:sSubPr>
+                        <m:e>
+                          <m:r>
+                            <a:rPr lang="fr-CH" sz="1000" i="1" smtClean="0">
+                              <a:latin typeface="Cambria Math" panose="02040503050406030204" pitchFamily="18" charset="0"/>
+                            </a:rPr>
+                            <m:t>𝑋</m:t>
+                          </m:r>
+                        </m:e>
+                        <m:sub>
+                          <m:r>
+                            <a:rPr lang="de-CH" sz="1000" b="0" i="1" smtClean="0">
+                              <a:latin typeface="Cambria Math" panose="02040503050406030204" pitchFamily="18" charset="0"/>
+                            </a:rPr>
+                            <m:t>𝑁</m:t>
+                          </m:r>
+                        </m:sub>
+                      </m:sSub>
                       <m:d>
                         <m:dPr>
                           <m:ctrlPr>
@@ -5440,7 +5638,7 @@
             </p:txBody>
           </p:sp>
         </mc:Choice>
-        <mc:Fallback xmlns="">
+        <mc:Fallback>
           <p:sp>
             <p:nvSpPr>
               <p:cNvPr id="10" name="Textfeld 9">
@@ -5457,8 +5655,8 @@
             </p:nvSpPr>
             <p:spPr>
               <a:xfrm>
-                <a:off x="3591003" y="6136065"/>
-                <a:ext cx="2120772" cy="432875"/>
+                <a:off x="3495838" y="6136065"/>
+                <a:ext cx="2266583" cy="432875"/>
               </a:xfrm>
               <a:prstGeom prst="rect">
                 <a:avLst/>
@@ -5466,7 +5664,7 @@
               <a:blipFill>
                 <a:blip r:embed="rId8"/>
                 <a:stretch>
-                  <a:fillRect l="-862" t="-116901" r="-862" b="-178873"/>
+                  <a:fillRect t="-116901" b="-178873"/>
                 </a:stretch>
               </a:blipFill>
             </p:spPr>
@@ -5485,8 +5683,8 @@
           </p:sp>
         </mc:Fallback>
       </mc:AlternateContent>
-      <mc:AlternateContent xmlns:mc="http://schemas.openxmlformats.org/markup-compatibility/2006" xmlns:a14="http://schemas.microsoft.com/office/drawing/2010/main">
-        <mc:Choice Requires="a14">
+      <mc:AlternateContent xmlns:mc="http://schemas.openxmlformats.org/markup-compatibility/2006">
+        <mc:Choice xmlns:a14="http://schemas.microsoft.com/office/drawing/2010/main" Requires="a14">
           <p:sp>
             <p:nvSpPr>
               <p:cNvPr id="11" name="Textfeld 10">
@@ -5501,7 +5699,7 @@
             </p:nvSpPr>
             <p:spPr>
               <a:xfrm>
-                <a:off x="3682443" y="5425579"/>
+                <a:off x="3707064" y="5425579"/>
                 <a:ext cx="1311962" cy="432875"/>
               </a:xfrm>
               <a:prstGeom prst="rect">
@@ -5814,7 +6012,7 @@
             </p:txBody>
           </p:sp>
         </mc:Choice>
-        <mc:Fallback xmlns="">
+        <mc:Fallback>
           <p:sp>
             <p:nvSpPr>
               <p:cNvPr id="11" name="Textfeld 10">
@@ -5831,7 +6029,7 @@
             </p:nvSpPr>
             <p:spPr>
               <a:xfrm>
-                <a:off x="3682443" y="5425579"/>
+                <a:off x="3707064" y="5425579"/>
                 <a:ext cx="1311962" cy="432875"/>
               </a:xfrm>
               <a:prstGeom prst="rect">
@@ -6047,8 +6245,8 @@
           </p:sp>
         </mc:Fallback>
       </mc:AlternateContent>
-      <mc:AlternateContent xmlns:mc="http://schemas.openxmlformats.org/markup-compatibility/2006" xmlns:a14="http://schemas.microsoft.com/office/drawing/2010/main">
-        <mc:Choice Requires="a14">
+      <mc:AlternateContent xmlns:mc="http://schemas.openxmlformats.org/markup-compatibility/2006">
+        <mc:Choice xmlns:a14="http://schemas.microsoft.com/office/drawing/2010/main" Requires="a14">
           <p:sp>
             <p:nvSpPr>
               <p:cNvPr id="14" name="Textfeld 13">
@@ -6063,8 +6261,8 @@
             </p:nvSpPr>
             <p:spPr>
               <a:xfrm>
-                <a:off x="6887700" y="6136065"/>
-                <a:ext cx="2227661" cy="432875"/>
+                <a:off x="6735300" y="6136065"/>
+                <a:ext cx="2429639" cy="432875"/>
               </a:xfrm>
               <a:prstGeom prst="rect">
                 <a:avLst/>
@@ -6084,12 +6282,31 @@
                       <m:jc m:val="centerGroup"/>
                     </m:oMathParaPr>
                     <m:oMath xmlns:m="http://schemas.openxmlformats.org/officeDocument/2006/math">
-                      <m:r>
-                        <a:rPr lang="fr-CH" sz="1000" b="0" i="1" smtClean="0">
-                          <a:latin typeface="Cambria Math" panose="02040503050406030204" pitchFamily="18" charset="0"/>
-                        </a:rPr>
-                        <m:t>𝜙</m:t>
-                      </m:r>
+                      <m:sSub>
+                        <m:sSubPr>
+                          <m:ctrlPr>
+                            <a:rPr lang="de-CH" sz="1000" b="0" i="1" smtClean="0">
+                              <a:latin typeface="Cambria Math" panose="02040503050406030204" pitchFamily="18" charset="0"/>
+                            </a:rPr>
+                          </m:ctrlPr>
+                        </m:sSubPr>
+                        <m:e>
+                          <m:r>
+                            <a:rPr lang="fr-CH" sz="1000" b="0" i="1" smtClean="0">
+                              <a:latin typeface="Cambria Math" panose="02040503050406030204" pitchFamily="18" charset="0"/>
+                            </a:rPr>
+                            <m:t>𝜙</m:t>
+                          </m:r>
+                        </m:e>
+                        <m:sub>
+                          <m:r>
+                            <a:rPr lang="de-CH" sz="1000" b="0" i="1" smtClean="0">
+                              <a:latin typeface="Cambria Math" panose="02040503050406030204" pitchFamily="18" charset="0"/>
+                            </a:rPr>
+                            <m:t>𝑥</m:t>
+                          </m:r>
+                        </m:sub>
+                      </m:sSub>
                       <m:d>
                         <m:dPr>
                           <m:ctrlPr>
@@ -6177,12 +6394,31 @@
                               </m:ctrlPr>
                             </m:dPr>
                             <m:e>
-                              <m:r>
-                                <a:rPr lang="fr-CH" sz="1000" b="0" i="1" smtClean="0">
-                                  <a:latin typeface="Cambria Math" panose="02040503050406030204" pitchFamily="18" charset="0"/>
-                                </a:rPr>
-                                <m:t>𝑋</m:t>
-                              </m:r>
+                              <m:sSub>
+                                <m:sSubPr>
+                                  <m:ctrlPr>
+                                    <a:rPr lang="de-CH" sz="1000" b="0" i="1" smtClean="0">
+                                      <a:latin typeface="Cambria Math" panose="02040503050406030204" pitchFamily="18" charset="0"/>
+                                    </a:rPr>
+                                  </m:ctrlPr>
+                                </m:sSubPr>
+                                <m:e>
+                                  <m:r>
+                                    <a:rPr lang="fr-CH" sz="1000" b="0" i="1" smtClean="0">
+                                      <a:latin typeface="Cambria Math" panose="02040503050406030204" pitchFamily="18" charset="0"/>
+                                    </a:rPr>
+                                    <m:t>𝑋</m:t>
+                                  </m:r>
+                                </m:e>
+                                <m:sub>
+                                  <m:r>
+                                    <a:rPr lang="de-CH" sz="1000" b="0" i="1" smtClean="0">
+                                      <a:latin typeface="Cambria Math" panose="02040503050406030204" pitchFamily="18" charset="0"/>
+                                    </a:rPr>
+                                    <m:t>𝑁</m:t>
+                                  </m:r>
+                                </m:sub>
+                              </m:sSub>
                               <m:d>
                                 <m:dPr>
                                   <m:ctrlPr>
@@ -6389,7 +6625,7 @@
             </p:txBody>
           </p:sp>
         </mc:Choice>
-        <mc:Fallback xmlns="">
+        <mc:Fallback>
           <p:sp>
             <p:nvSpPr>
               <p:cNvPr id="14" name="Textfeld 13">
@@ -6406,8 +6642,8 @@
             </p:nvSpPr>
             <p:spPr>
               <a:xfrm>
-                <a:off x="6887700" y="6136065"/>
-                <a:ext cx="2227661" cy="432875"/>
+                <a:off x="6735300" y="6136065"/>
+                <a:ext cx="2429639" cy="432875"/>
               </a:xfrm>
               <a:prstGeom prst="rect">
                 <a:avLst/>
@@ -6415,7 +6651,7 @@
               <a:blipFill>
                 <a:blip r:embed="rId11"/>
                 <a:stretch>
-                  <a:fillRect l="-1644" t="-116901" r="-9863" b="-178873"/>
+                  <a:fillRect t="-116901" r="-7538" b="-178873"/>
                 </a:stretch>
               </a:blipFill>
             </p:spPr>
@@ -6698,8 +6934,8 @@
           </p:sp>
         </mc:Fallback>
       </mc:AlternateContent>
-      <mc:AlternateContent xmlns:mc="http://schemas.openxmlformats.org/markup-compatibility/2006" xmlns:a14="http://schemas.microsoft.com/office/drawing/2010/main">
-        <mc:Choice Requires="a14">
+      <mc:AlternateContent xmlns:mc="http://schemas.openxmlformats.org/markup-compatibility/2006">
+        <mc:Choice xmlns:a14="http://schemas.microsoft.com/office/drawing/2010/main" Requires="a14">
           <p:sp>
             <p:nvSpPr>
               <p:cNvPr id="16" name="Textfeld 15">
@@ -6714,7 +6950,7 @@
             </p:nvSpPr>
             <p:spPr>
               <a:xfrm>
-                <a:off x="6887700" y="1380859"/>
+                <a:off x="6968980" y="1380859"/>
                 <a:ext cx="2038379" cy="419602"/>
               </a:xfrm>
               <a:prstGeom prst="rect">
@@ -6965,7 +7201,7 @@
             </p:txBody>
           </p:sp>
         </mc:Choice>
-        <mc:Fallback xmlns="">
+        <mc:Fallback>
           <p:sp>
             <p:nvSpPr>
               <p:cNvPr id="16" name="Textfeld 15">
@@ -6982,7 +7218,7 @@
             </p:nvSpPr>
             <p:spPr>
               <a:xfrm>
-                <a:off x="6887700" y="1380859"/>
+                <a:off x="6968980" y="1380859"/>
                 <a:ext cx="2038379" cy="419602"/>
               </a:xfrm>
               <a:prstGeom prst="rect">
@@ -6991,7 +7227,7 @@
               <a:blipFill>
                 <a:blip r:embed="rId13"/>
                 <a:stretch>
-                  <a:fillRect l="-1198" t="-126471" r="-11677" b="-186765"/>
+                  <a:fillRect l="-896" t="-126471" r="-11642" b="-186765"/>
                 </a:stretch>
               </a:blipFill>
             </p:spPr>
@@ -7010,8 +7246,8 @@
           </p:sp>
         </mc:Fallback>
       </mc:AlternateContent>
-      <mc:AlternateContent xmlns:mc="http://schemas.openxmlformats.org/markup-compatibility/2006" xmlns:a14="http://schemas.microsoft.com/office/drawing/2010/main">
-        <mc:Choice Requires="a14">
+      <mc:AlternateContent xmlns:mc="http://schemas.openxmlformats.org/markup-compatibility/2006">
+        <mc:Choice xmlns:a14="http://schemas.microsoft.com/office/drawing/2010/main" Requires="a14">
           <p:sp>
             <p:nvSpPr>
               <p:cNvPr id="18" name="Textfeld 17">
@@ -7026,7 +7262,7 @@
             </p:nvSpPr>
             <p:spPr>
               <a:xfrm>
-                <a:off x="10064373" y="1380859"/>
+                <a:off x="10135493" y="1380859"/>
                 <a:ext cx="1532150" cy="419602"/>
               </a:xfrm>
               <a:prstGeom prst="rect">
@@ -7198,7 +7434,7 @@
             </p:txBody>
           </p:sp>
         </mc:Choice>
-        <mc:Fallback xmlns="">
+        <mc:Fallback>
           <p:sp>
             <p:nvSpPr>
               <p:cNvPr id="18" name="Textfeld 17">
@@ -7215,7 +7451,7 @@
             </p:nvSpPr>
             <p:spPr>
               <a:xfrm>
-                <a:off x="10064373" y="1380859"/>
+                <a:off x="10135493" y="1380859"/>
                 <a:ext cx="1532150" cy="419602"/>
               </a:xfrm>
               <a:prstGeom prst="rect">
@@ -7282,12 +7518,22 @@
                     <m:oMath xmlns:m="http://schemas.openxmlformats.org/officeDocument/2006/math">
                       <m:r>
                         <a:rPr lang="fr-CH" sz="800" b="0" i="1" smtClean="0">
+                          <a:solidFill>
+                            <a:schemeClr val="bg1">
+                              <a:lumMod val="50000"/>
+                            </a:schemeClr>
+                          </a:solidFill>
                           <a:latin typeface="Cambria Math" panose="02040503050406030204" pitchFamily="18" charset="0"/>
                         </a:rPr>
                         <m:t>𝑘</m:t>
                       </m:r>
                       <m:r>
                         <a:rPr lang="fr-CH" sz="800" b="0" i="1" smtClean="0">
+                          <a:solidFill>
+                            <a:schemeClr val="bg1">
+                              <a:lumMod val="50000"/>
+                            </a:schemeClr>
+                          </a:solidFill>
                           <a:latin typeface="Cambria Math" panose="02040503050406030204" pitchFamily="18" charset="0"/>
                         </a:rPr>
                         <m:t>∈</m:t>
@@ -7298,6 +7544,11 @@
                           <m:endChr m:val="}"/>
                           <m:ctrlPr>
                             <a:rPr lang="fr-CH" sz="800" b="0" i="1" smtClean="0">
+                              <a:solidFill>
+                                <a:schemeClr val="bg1">
+                                  <a:lumMod val="50000"/>
+                                </a:schemeClr>
+                              </a:solidFill>
                               <a:latin typeface="Cambria Math" panose="02040503050406030204" pitchFamily="18" charset="0"/>
                             </a:rPr>
                           </m:ctrlPr>
@@ -7305,18 +7556,33 @@
                         <m:e>
                           <m:r>
                             <a:rPr lang="fr-CH" sz="800" b="0" i="1" smtClean="0">
+                              <a:solidFill>
+                                <a:schemeClr val="bg1">
+                                  <a:lumMod val="50000"/>
+                                </a:schemeClr>
+                              </a:solidFill>
                               <a:latin typeface="Cambria Math" panose="02040503050406030204" pitchFamily="18" charset="0"/>
                             </a:rPr>
                             <m:t>0,…,</m:t>
                           </m:r>
                           <m:r>
                             <a:rPr lang="fr-CH" sz="800" b="0" i="1" smtClean="0">
+                              <a:solidFill>
+                                <a:schemeClr val="bg1">
+                                  <a:lumMod val="50000"/>
+                                </a:schemeClr>
+                              </a:solidFill>
                               <a:latin typeface="Cambria Math" panose="02040503050406030204" pitchFamily="18" charset="0"/>
                             </a:rPr>
                             <m:t>𝑁</m:t>
                           </m:r>
                           <m:r>
                             <a:rPr lang="fr-CH" sz="800" b="0" i="1" smtClean="0">
+                              <a:solidFill>
+                                <a:schemeClr val="bg1">
+                                  <a:lumMod val="50000"/>
+                                </a:schemeClr>
+                              </a:solidFill>
                               <a:latin typeface="Cambria Math" panose="02040503050406030204" pitchFamily="18" charset="0"/>
                             </a:rPr>
                             <m:t>−1</m:t>
@@ -7326,7 +7592,13 @@
                     </m:oMath>
                   </m:oMathPara>
                 </a14:m>
-                <a:endParaRPr lang="de-CH" sz="800" dirty="0"/>
+                <a:endParaRPr lang="de-CH" sz="800" dirty="0">
+                  <a:solidFill>
+                    <a:schemeClr val="bg1">
+                      <a:lumMod val="50000"/>
+                    </a:schemeClr>
+                  </a:solidFill>
+                </a:endParaRPr>
               </a:p>
             </p:txBody>
           </p:sp>
@@ -7414,8 +7686,8 @@
         </p:blipFill>
         <p:spPr>
           <a:xfrm>
-            <a:off x="-175269" y="1984732"/>
-            <a:ext cx="3552000" cy="2664000"/>
+            <a:off x="-174593" y="1984732"/>
+            <a:ext cx="3550647" cy="2664000"/>
           </a:xfrm>
           <a:prstGeom prst="rect">
             <a:avLst/>
@@ -7460,8 +7732,8 @@
         </p:blipFill>
         <p:spPr>
           <a:xfrm>
-            <a:off x="3025131" y="1984732"/>
-            <a:ext cx="3552000" cy="2664000"/>
+            <a:off x="3025807" y="1984732"/>
+            <a:ext cx="3550647" cy="2664000"/>
           </a:xfrm>
           <a:prstGeom prst="rect">
             <a:avLst/>
@@ -7506,8 +7778,8 @@
         </p:blipFill>
         <p:spPr>
           <a:xfrm>
-            <a:off x="6225531" y="1984732"/>
-            <a:ext cx="3552000" cy="2664000"/>
+            <a:off x="6226207" y="1984732"/>
+            <a:ext cx="3550647" cy="2664000"/>
           </a:xfrm>
           <a:prstGeom prst="rect">
             <a:avLst/>
@@ -7552,8 +7824,8 @@
         </p:blipFill>
         <p:spPr>
           <a:xfrm>
-            <a:off x="9425931" y="1984732"/>
-            <a:ext cx="3552000" cy="2664000"/>
+            <a:off x="9426607" y="1984732"/>
+            <a:ext cx="3550647" cy="2664000"/>
           </a:xfrm>
           <a:prstGeom prst="rect">
             <a:avLst/>
@@ -7598,8 +7870,8 @@
         </p:blipFill>
         <p:spPr>
           <a:xfrm>
-            <a:off x="-175269" y="6894000"/>
-            <a:ext cx="3552000" cy="2664000"/>
+            <a:off x="-174593" y="6894000"/>
+            <a:ext cx="3550647" cy="2664000"/>
           </a:xfrm>
           <a:prstGeom prst="rect">
             <a:avLst/>
@@ -7644,8 +7916,8 @@
         </p:blipFill>
         <p:spPr>
           <a:xfrm>
-            <a:off x="3025131" y="6894000"/>
-            <a:ext cx="3552000" cy="2664000"/>
+            <a:off x="3025807" y="6894000"/>
+            <a:ext cx="3550647" cy="2664000"/>
           </a:xfrm>
           <a:prstGeom prst="rect">
             <a:avLst/>
@@ -7690,8 +7962,8 @@
         </p:blipFill>
         <p:spPr>
           <a:xfrm>
-            <a:off x="6225531" y="6894000"/>
-            <a:ext cx="3552000" cy="2664000"/>
+            <a:off x="6226207" y="6894000"/>
+            <a:ext cx="3550647" cy="2664000"/>
           </a:xfrm>
           <a:prstGeom prst="rect">
             <a:avLst/>
@@ -7736,8 +8008,8 @@
         </p:blipFill>
         <p:spPr>
           <a:xfrm>
-            <a:off x="9425931" y="6894000"/>
-            <a:ext cx="3552000" cy="2664000"/>
+            <a:off x="9426607" y="6894000"/>
+            <a:ext cx="3550647" cy="2664000"/>
           </a:xfrm>
           <a:prstGeom prst="rect">
             <a:avLst/>

</xml_diff>